<commit_message>
added SQLServerAlwaysEncrypted.CEKGenerator.csproj, updated presentation/Zabezpiecz swoje dane na przykładzie SQL Server Always Encrypted.pptx
</commit_message>
<xml_diff>
--- a/presentation/Zabezpiecz swoje dane na przykładzie SQL Server Always Encrypted.pptx
+++ b/presentation/Zabezpiecz swoje dane na przykładzie SQL Server Always Encrypted.pptx
@@ -5,7 +5,7 @@
     <p:sldMasterId id="2147483648" r:id="rId1"/>
   </p:sldMasterIdLst>
   <p:notesMasterIdLst>
-    <p:notesMasterId r:id="rId17"/>
+    <p:notesMasterId r:id="rId19"/>
   </p:notesMasterIdLst>
   <p:sldIdLst>
     <p:sldId id="256" r:id="rId2"/>
@@ -18,11 +18,13 @@
     <p:sldId id="265" r:id="rId9"/>
     <p:sldId id="266" r:id="rId10"/>
     <p:sldId id="263" r:id="rId11"/>
-    <p:sldId id="262" r:id="rId12"/>
-    <p:sldId id="267" r:id="rId13"/>
-    <p:sldId id="268" r:id="rId14"/>
-    <p:sldId id="269" r:id="rId15"/>
-    <p:sldId id="270" r:id="rId16"/>
+    <p:sldId id="271" r:id="rId12"/>
+    <p:sldId id="272" r:id="rId13"/>
+    <p:sldId id="262" r:id="rId14"/>
+    <p:sldId id="267" r:id="rId15"/>
+    <p:sldId id="268" r:id="rId16"/>
+    <p:sldId id="269" r:id="rId17"/>
+    <p:sldId id="270" r:id="rId18"/>
   </p:sldIdLst>
   <p:sldSz cx="12192000" cy="6858000"/>
   <p:notesSz cx="6858000" cy="9144000"/>
@@ -4626,10 +4628,10 @@
       </p:grpSpPr>
       <p:sp>
         <p:nvSpPr>
-          <p:cNvPr id="2" name="Title 1">
-            <a:extLst>
-              <a:ext uri="{FF2B5EF4-FFF2-40B4-BE49-F238E27FC236}">
-                <a16:creationId xmlns:a16="http://schemas.microsoft.com/office/drawing/2014/main" id="{745E9FD6-A714-4710-A4BD-824C8A3BBF24}"/>
+          <p:cNvPr id="2" name="Tytuł 1">
+            <a:extLst>
+              <a:ext uri="{FF2B5EF4-FFF2-40B4-BE49-F238E27FC236}">
+                <a16:creationId xmlns:a16="http://schemas.microsoft.com/office/drawing/2014/main" id="{3143B76F-5784-43F6-88E2-5443B2498508}"/>
               </a:ext>
             </a:extLst>
           </p:cNvPr>
@@ -4647,15 +4649,40 @@
           <a:p>
             <a:r>
               <a:rPr lang="pl-PL" dirty="0"/>
-              <a:t>Demo</a:t>
-            </a:r>
+              <a:t>Rotacje kluczy</a:t>
+            </a:r>
+          </a:p>
+        </p:txBody>
+      </p:sp>
+      <p:sp>
+        <p:nvSpPr>
+          <p:cNvPr id="3" name="Symbol zastępczy zawartości 2">
+            <a:extLst>
+              <a:ext uri="{FF2B5EF4-FFF2-40B4-BE49-F238E27FC236}">
+                <a16:creationId xmlns:a16="http://schemas.microsoft.com/office/drawing/2014/main" id="{090FB535-44D7-4DD7-BD84-22DDFB8B7001}"/>
+              </a:ext>
+            </a:extLst>
+          </p:cNvPr>
+          <p:cNvSpPr>
+            <a:spLocks noGrp="1"/>
+          </p:cNvSpPr>
+          <p:nvPr>
+            <p:ph idx="1"/>
+          </p:nvPr>
+        </p:nvSpPr>
+        <p:spPr/>
+        <p:txBody>
+          <a:bodyPr/>
+          <a:lstStyle/>
+          <a:p>
+            <a:endParaRPr lang="pl-PL" dirty="0"/>
           </a:p>
         </p:txBody>
       </p:sp>
     </p:spTree>
     <p:extLst>
       <p:ext uri="{BB962C8B-B14F-4D97-AF65-F5344CB8AC3E}">
-        <p14:creationId xmlns:p14="http://schemas.microsoft.com/office/powerpoint/2010/main" val="3874564869"/>
+        <p14:creationId xmlns:p14="http://schemas.microsoft.com/office/powerpoint/2010/main" val="2912622225"/>
       </p:ext>
     </p:extLst>
   </p:cSld>
@@ -4697,7 +4724,7 @@
           <p:cNvPr id="2" name="Tytuł 1">
             <a:extLst>
               <a:ext uri="{FF2B5EF4-FFF2-40B4-BE49-F238E27FC236}">
-                <a16:creationId xmlns:a16="http://schemas.microsoft.com/office/drawing/2014/main" id="{72FAA12E-658B-434E-86A2-B5C77B507388}"/>
+                <a16:creationId xmlns:a16="http://schemas.microsoft.com/office/drawing/2014/main" id="{3143B76F-5784-43F6-88E2-5443B2498508}"/>
               </a:ext>
             </a:extLst>
           </p:cNvPr>
@@ -4715,91 +4742,40 @@
           <a:p>
             <a:r>
               <a:rPr lang="pl-PL" dirty="0"/>
-              <a:t>Wydajność</a:t>
-            </a:r>
-          </a:p>
-        </p:txBody>
-      </p:sp>
-      <p:pic>
-        <p:nvPicPr>
-          <p:cNvPr id="5" name="Symbol zastępczy zawartości 4">
-            <a:extLst>
-              <a:ext uri="{FF2B5EF4-FFF2-40B4-BE49-F238E27FC236}">
-                <a16:creationId xmlns:a16="http://schemas.microsoft.com/office/drawing/2014/main" id="{B50BAFAF-63AF-4092-8973-28180BC0E43E}"/>
-              </a:ext>
-            </a:extLst>
-          </p:cNvPr>
-          <p:cNvPicPr>
-            <a:picLocks noGrp="1" noChangeAspect="1"/>
-          </p:cNvPicPr>
+              <a:t>Migracje danych</a:t>
+            </a:r>
+          </a:p>
+        </p:txBody>
+      </p:sp>
+      <p:sp>
+        <p:nvSpPr>
+          <p:cNvPr id="3" name="Symbol zastępczy zawartości 2">
+            <a:extLst>
+              <a:ext uri="{FF2B5EF4-FFF2-40B4-BE49-F238E27FC236}">
+                <a16:creationId xmlns:a16="http://schemas.microsoft.com/office/drawing/2014/main" id="{090FB535-44D7-4DD7-BD84-22DDFB8B7001}"/>
+              </a:ext>
+            </a:extLst>
+          </p:cNvPr>
+          <p:cNvSpPr>
+            <a:spLocks noGrp="1"/>
+          </p:cNvSpPr>
           <p:nvPr>
             <p:ph idx="1"/>
           </p:nvPr>
-        </p:nvPicPr>
-        <p:blipFill>
-          <a:blip r:embed="rId3">
-            <a:extLst>
-              <a:ext uri="{28A0092B-C50C-407E-A947-70E740481C1C}">
-                <a14:useLocalDpi xmlns:a14="http://schemas.microsoft.com/office/drawing/2010/main" val="0"/>
-              </a:ext>
-            </a:extLst>
-          </a:blip>
-          <a:stretch>
-            <a:fillRect/>
-          </a:stretch>
-        </p:blipFill>
-        <p:spPr>
-          <a:xfrm>
-            <a:off x="1158083" y="1351900"/>
-            <a:ext cx="8547777" cy="4752232"/>
-          </a:xfrm>
-        </p:spPr>
-      </p:pic>
-      <p:sp>
-        <p:nvSpPr>
-          <p:cNvPr id="6" name="pole tekstowe 5">
-            <a:extLst>
-              <a:ext uri="{FF2B5EF4-FFF2-40B4-BE49-F238E27FC236}">
-                <a16:creationId xmlns:a16="http://schemas.microsoft.com/office/drawing/2014/main" id="{FB749529-9872-4F65-A01E-7F5C8EB1927B}"/>
-              </a:ext>
-            </a:extLst>
-          </p:cNvPr>
-          <p:cNvSpPr txBox="1"/>
-          <p:nvPr/>
-        </p:nvSpPr>
-        <p:spPr>
-          <a:xfrm>
-            <a:off x="5847164" y="6194630"/>
-            <a:ext cx="5506636" cy="276999"/>
-          </a:xfrm>
-          <a:prstGeom prst="rect">
-            <a:avLst/>
-          </a:prstGeom>
-          <a:noFill/>
-        </p:spPr>
-        <p:txBody>
-          <a:bodyPr wrap="none" rtlCol="0">
-            <a:spAutoFit/>
-          </a:bodyPr>
+        </p:nvSpPr>
+        <p:spPr/>
+        <p:txBody>
+          <a:bodyPr/>
           <a:lstStyle/>
           <a:p>
-            <a:r>
-              <a:rPr lang="pl-PL" sz="1200" dirty="0">
-                <a:solidFill>
-                  <a:schemeClr val="bg1">
-                    <a:lumMod val="75000"/>
-                  </a:schemeClr>
-                </a:solidFill>
-              </a:rPr>
-              <a:t>https://sqlperformance.com/2015/08/sql-server-2016/perf-impact-always-encrypted</a:t>
-            </a:r>
+            <a:endParaRPr lang="pl-PL" dirty="0"/>
           </a:p>
         </p:txBody>
       </p:sp>
     </p:spTree>
     <p:extLst>
       <p:ext uri="{BB962C8B-B14F-4D97-AF65-F5344CB8AC3E}">
-        <p14:creationId xmlns:p14="http://schemas.microsoft.com/office/powerpoint/2010/main" val="3624638399"/>
+        <p14:creationId xmlns:p14="http://schemas.microsoft.com/office/powerpoint/2010/main" val="716740257"/>
       </p:ext>
     </p:extLst>
   </p:cSld>
@@ -4838,10 +4814,10 @@
       </p:grpSpPr>
       <p:sp>
         <p:nvSpPr>
-          <p:cNvPr id="2" name="Tytuł 1">
-            <a:extLst>
-              <a:ext uri="{FF2B5EF4-FFF2-40B4-BE49-F238E27FC236}">
-                <a16:creationId xmlns:a16="http://schemas.microsoft.com/office/drawing/2014/main" id="{72FAA12E-658B-434E-86A2-B5C77B507388}"/>
+          <p:cNvPr id="2" name="Title 1">
+            <a:extLst>
+              <a:ext uri="{FF2B5EF4-FFF2-40B4-BE49-F238E27FC236}">
+                <a16:creationId xmlns:a16="http://schemas.microsoft.com/office/drawing/2014/main" id="{745E9FD6-A714-4710-A4BD-824C8A3BBF24}"/>
               </a:ext>
             </a:extLst>
           </p:cNvPr>
@@ -4859,83 +4835,7 @@
           <a:p>
             <a:r>
               <a:rPr lang="pl-PL" dirty="0"/>
-              <a:t>Miejsce</a:t>
-            </a:r>
-          </a:p>
-        </p:txBody>
-      </p:sp>
-      <p:pic>
-        <p:nvPicPr>
-          <p:cNvPr id="8" name="Symbol zastępczy zawartości 7">
-            <a:extLst>
-              <a:ext uri="{FF2B5EF4-FFF2-40B4-BE49-F238E27FC236}">
-                <a16:creationId xmlns:a16="http://schemas.microsoft.com/office/drawing/2014/main" id="{AB083CB2-4E14-48ED-9613-A9875035E6AC}"/>
-              </a:ext>
-            </a:extLst>
-          </p:cNvPr>
-          <p:cNvPicPr>
-            <a:picLocks noGrp="1" noChangeAspect="1"/>
-          </p:cNvPicPr>
-          <p:nvPr>
-            <p:ph idx="1"/>
-          </p:nvPr>
-        </p:nvPicPr>
-        <p:blipFill>
-          <a:blip r:embed="rId3">
-            <a:extLst>
-              <a:ext uri="{28A0092B-C50C-407E-A947-70E740481C1C}">
-                <a14:useLocalDpi xmlns:a14="http://schemas.microsoft.com/office/drawing/2010/main" val="0"/>
-              </a:ext>
-            </a:extLst>
-          </a:blip>
-          <a:stretch>
-            <a:fillRect/>
-          </a:stretch>
-        </p:blipFill>
-        <p:spPr>
-          <a:xfrm>
-            <a:off x="1432193" y="1311704"/>
-            <a:ext cx="8354541" cy="4882926"/>
-          </a:xfrm>
-        </p:spPr>
-      </p:pic>
-      <p:sp>
-        <p:nvSpPr>
-          <p:cNvPr id="6" name="pole tekstowe 5">
-            <a:extLst>
-              <a:ext uri="{FF2B5EF4-FFF2-40B4-BE49-F238E27FC236}">
-                <a16:creationId xmlns:a16="http://schemas.microsoft.com/office/drawing/2014/main" id="{FB749529-9872-4F65-A01E-7F5C8EB1927B}"/>
-              </a:ext>
-            </a:extLst>
-          </p:cNvPr>
-          <p:cNvSpPr txBox="1"/>
-          <p:nvPr/>
-        </p:nvSpPr>
-        <p:spPr>
-          <a:xfrm>
-            <a:off x="5847164" y="6194630"/>
-            <a:ext cx="5506636" cy="276999"/>
-          </a:xfrm>
-          <a:prstGeom prst="rect">
-            <a:avLst/>
-          </a:prstGeom>
-          <a:noFill/>
-        </p:spPr>
-        <p:txBody>
-          <a:bodyPr wrap="none" rtlCol="0">
-            <a:spAutoFit/>
-          </a:bodyPr>
-          <a:lstStyle/>
-          <a:p>
-            <a:r>
-              <a:rPr lang="pl-PL" sz="1200" dirty="0">
-                <a:solidFill>
-                  <a:schemeClr val="bg1">
-                    <a:lumMod val="75000"/>
-                  </a:schemeClr>
-                </a:solidFill>
-              </a:rPr>
-              <a:t>https://sqlperformance.com/2015/08/sql-server-2016/perf-impact-always-encrypted</a:t>
+              <a:t>Demo</a:t>
             </a:r>
           </a:p>
         </p:txBody>
@@ -4943,7 +4843,7 @@
     </p:spTree>
     <p:extLst>
       <p:ext uri="{BB962C8B-B14F-4D97-AF65-F5344CB8AC3E}">
-        <p14:creationId xmlns:p14="http://schemas.microsoft.com/office/powerpoint/2010/main" val="1218132711"/>
+        <p14:creationId xmlns:p14="http://schemas.microsoft.com/office/powerpoint/2010/main" val="3874564869"/>
       </p:ext>
     </p:extLst>
   </p:cSld>
@@ -4985,6 +4885,294 @@
           <p:cNvPr id="2" name="Tytuł 1">
             <a:extLst>
               <a:ext uri="{FF2B5EF4-FFF2-40B4-BE49-F238E27FC236}">
+                <a16:creationId xmlns:a16="http://schemas.microsoft.com/office/drawing/2014/main" id="{72FAA12E-658B-434E-86A2-B5C77B507388}"/>
+              </a:ext>
+            </a:extLst>
+          </p:cNvPr>
+          <p:cNvSpPr>
+            <a:spLocks noGrp="1"/>
+          </p:cNvSpPr>
+          <p:nvPr>
+            <p:ph type="title"/>
+          </p:nvPr>
+        </p:nvSpPr>
+        <p:spPr/>
+        <p:txBody>
+          <a:bodyPr/>
+          <a:lstStyle/>
+          <a:p>
+            <a:r>
+              <a:rPr lang="pl-PL" dirty="0"/>
+              <a:t>Wydajność</a:t>
+            </a:r>
+          </a:p>
+        </p:txBody>
+      </p:sp>
+      <p:pic>
+        <p:nvPicPr>
+          <p:cNvPr id="5" name="Symbol zastępczy zawartości 4">
+            <a:extLst>
+              <a:ext uri="{FF2B5EF4-FFF2-40B4-BE49-F238E27FC236}">
+                <a16:creationId xmlns:a16="http://schemas.microsoft.com/office/drawing/2014/main" id="{B50BAFAF-63AF-4092-8973-28180BC0E43E}"/>
+              </a:ext>
+            </a:extLst>
+          </p:cNvPr>
+          <p:cNvPicPr>
+            <a:picLocks noGrp="1" noChangeAspect="1"/>
+          </p:cNvPicPr>
+          <p:nvPr>
+            <p:ph idx="1"/>
+          </p:nvPr>
+        </p:nvPicPr>
+        <p:blipFill>
+          <a:blip r:embed="rId3">
+            <a:extLst>
+              <a:ext uri="{28A0092B-C50C-407E-A947-70E740481C1C}">
+                <a14:useLocalDpi xmlns:a14="http://schemas.microsoft.com/office/drawing/2010/main" val="0"/>
+              </a:ext>
+            </a:extLst>
+          </a:blip>
+          <a:stretch>
+            <a:fillRect/>
+          </a:stretch>
+        </p:blipFill>
+        <p:spPr>
+          <a:xfrm>
+            <a:off x="1158083" y="1351900"/>
+            <a:ext cx="8547777" cy="4752232"/>
+          </a:xfrm>
+        </p:spPr>
+      </p:pic>
+      <p:sp>
+        <p:nvSpPr>
+          <p:cNvPr id="6" name="pole tekstowe 5">
+            <a:extLst>
+              <a:ext uri="{FF2B5EF4-FFF2-40B4-BE49-F238E27FC236}">
+                <a16:creationId xmlns:a16="http://schemas.microsoft.com/office/drawing/2014/main" id="{FB749529-9872-4F65-A01E-7F5C8EB1927B}"/>
+              </a:ext>
+            </a:extLst>
+          </p:cNvPr>
+          <p:cNvSpPr txBox="1"/>
+          <p:nvPr/>
+        </p:nvSpPr>
+        <p:spPr>
+          <a:xfrm>
+            <a:off x="5847164" y="6194630"/>
+            <a:ext cx="5506636" cy="276999"/>
+          </a:xfrm>
+          <a:prstGeom prst="rect">
+            <a:avLst/>
+          </a:prstGeom>
+          <a:noFill/>
+        </p:spPr>
+        <p:txBody>
+          <a:bodyPr wrap="none" rtlCol="0">
+            <a:spAutoFit/>
+          </a:bodyPr>
+          <a:lstStyle/>
+          <a:p>
+            <a:r>
+              <a:rPr lang="pl-PL" sz="1200" dirty="0">
+                <a:solidFill>
+                  <a:schemeClr val="bg1">
+                    <a:lumMod val="75000"/>
+                  </a:schemeClr>
+                </a:solidFill>
+              </a:rPr>
+              <a:t>https://sqlperformance.com/2015/08/sql-server-2016/perf-impact-always-encrypted</a:t>
+            </a:r>
+          </a:p>
+        </p:txBody>
+      </p:sp>
+    </p:spTree>
+    <p:extLst>
+      <p:ext uri="{BB962C8B-B14F-4D97-AF65-F5344CB8AC3E}">
+        <p14:creationId xmlns:p14="http://schemas.microsoft.com/office/powerpoint/2010/main" val="3624638399"/>
+      </p:ext>
+    </p:extLst>
+  </p:cSld>
+  <p:clrMapOvr>
+    <a:overrideClrMapping bg1="lt1" tx1="dk1" bg2="lt2" tx2="dk2" accent1="accent1" accent2="accent2" accent3="accent3" accent4="accent4" accent5="accent5" accent6="accent6" hlink="hlink" folHlink="folHlink"/>
+  </p:clrMapOvr>
+</p:sld>
+</file>
+
+<file path=ppt/slides/slide15.xml><?xml version="1.0" encoding="utf-8"?>
+<p:sld xmlns:a="http://schemas.openxmlformats.org/drawingml/2006/main" xmlns:r="http://schemas.openxmlformats.org/officeDocument/2006/relationships" xmlns:p="http://schemas.openxmlformats.org/presentationml/2006/main">
+  <p:cSld>
+    <p:bg>
+      <p:bgPr>
+        <a:solidFill>
+          <a:schemeClr val="bg1">
+            <a:lumMod val="95000"/>
+          </a:schemeClr>
+        </a:solidFill>
+        <a:effectLst/>
+      </p:bgPr>
+    </p:bg>
+    <p:spTree>
+      <p:nvGrpSpPr>
+        <p:cNvPr id="1" name=""/>
+        <p:cNvGrpSpPr/>
+        <p:nvPr/>
+      </p:nvGrpSpPr>
+      <p:grpSpPr>
+        <a:xfrm>
+          <a:off x="0" y="0"/>
+          <a:ext cx="0" cy="0"/>
+          <a:chOff x="0" y="0"/>
+          <a:chExt cx="0" cy="0"/>
+        </a:xfrm>
+      </p:grpSpPr>
+      <p:sp>
+        <p:nvSpPr>
+          <p:cNvPr id="2" name="Tytuł 1">
+            <a:extLst>
+              <a:ext uri="{FF2B5EF4-FFF2-40B4-BE49-F238E27FC236}">
+                <a16:creationId xmlns:a16="http://schemas.microsoft.com/office/drawing/2014/main" id="{72FAA12E-658B-434E-86A2-B5C77B507388}"/>
+              </a:ext>
+            </a:extLst>
+          </p:cNvPr>
+          <p:cNvSpPr>
+            <a:spLocks noGrp="1"/>
+          </p:cNvSpPr>
+          <p:nvPr>
+            <p:ph type="title"/>
+          </p:nvPr>
+        </p:nvSpPr>
+        <p:spPr/>
+        <p:txBody>
+          <a:bodyPr/>
+          <a:lstStyle/>
+          <a:p>
+            <a:r>
+              <a:rPr lang="pl-PL" dirty="0"/>
+              <a:t>Miejsce</a:t>
+            </a:r>
+          </a:p>
+        </p:txBody>
+      </p:sp>
+      <p:pic>
+        <p:nvPicPr>
+          <p:cNvPr id="8" name="Symbol zastępczy zawartości 7">
+            <a:extLst>
+              <a:ext uri="{FF2B5EF4-FFF2-40B4-BE49-F238E27FC236}">
+                <a16:creationId xmlns:a16="http://schemas.microsoft.com/office/drawing/2014/main" id="{AB083CB2-4E14-48ED-9613-A9875035E6AC}"/>
+              </a:ext>
+            </a:extLst>
+          </p:cNvPr>
+          <p:cNvPicPr>
+            <a:picLocks noGrp="1" noChangeAspect="1"/>
+          </p:cNvPicPr>
+          <p:nvPr>
+            <p:ph idx="1"/>
+          </p:nvPr>
+        </p:nvPicPr>
+        <p:blipFill>
+          <a:blip r:embed="rId3">
+            <a:extLst>
+              <a:ext uri="{28A0092B-C50C-407E-A947-70E740481C1C}">
+                <a14:useLocalDpi xmlns:a14="http://schemas.microsoft.com/office/drawing/2010/main" val="0"/>
+              </a:ext>
+            </a:extLst>
+          </a:blip>
+          <a:stretch>
+            <a:fillRect/>
+          </a:stretch>
+        </p:blipFill>
+        <p:spPr>
+          <a:xfrm>
+            <a:off x="1432193" y="1311704"/>
+            <a:ext cx="8354541" cy="4882926"/>
+          </a:xfrm>
+        </p:spPr>
+      </p:pic>
+      <p:sp>
+        <p:nvSpPr>
+          <p:cNvPr id="6" name="pole tekstowe 5">
+            <a:extLst>
+              <a:ext uri="{FF2B5EF4-FFF2-40B4-BE49-F238E27FC236}">
+                <a16:creationId xmlns:a16="http://schemas.microsoft.com/office/drawing/2014/main" id="{FB749529-9872-4F65-A01E-7F5C8EB1927B}"/>
+              </a:ext>
+            </a:extLst>
+          </p:cNvPr>
+          <p:cNvSpPr txBox="1"/>
+          <p:nvPr/>
+        </p:nvSpPr>
+        <p:spPr>
+          <a:xfrm>
+            <a:off x="5847164" y="6194630"/>
+            <a:ext cx="5506636" cy="276999"/>
+          </a:xfrm>
+          <a:prstGeom prst="rect">
+            <a:avLst/>
+          </a:prstGeom>
+          <a:noFill/>
+        </p:spPr>
+        <p:txBody>
+          <a:bodyPr wrap="none" rtlCol="0">
+            <a:spAutoFit/>
+          </a:bodyPr>
+          <a:lstStyle/>
+          <a:p>
+            <a:r>
+              <a:rPr lang="pl-PL" sz="1200" dirty="0">
+                <a:solidFill>
+                  <a:schemeClr val="bg1">
+                    <a:lumMod val="75000"/>
+                  </a:schemeClr>
+                </a:solidFill>
+              </a:rPr>
+              <a:t>https://sqlperformance.com/2015/08/sql-server-2016/perf-impact-always-encrypted</a:t>
+            </a:r>
+          </a:p>
+        </p:txBody>
+      </p:sp>
+    </p:spTree>
+    <p:extLst>
+      <p:ext uri="{BB962C8B-B14F-4D97-AF65-F5344CB8AC3E}">
+        <p14:creationId xmlns:p14="http://schemas.microsoft.com/office/powerpoint/2010/main" val="1218132711"/>
+      </p:ext>
+    </p:extLst>
+  </p:cSld>
+  <p:clrMapOvr>
+    <a:overrideClrMapping bg1="lt1" tx1="dk1" bg2="lt2" tx2="dk2" accent1="accent1" accent2="accent2" accent3="accent3" accent4="accent4" accent5="accent5" accent6="accent6" hlink="hlink" folHlink="folHlink"/>
+  </p:clrMapOvr>
+</p:sld>
+</file>
+
+<file path=ppt/slides/slide16.xml><?xml version="1.0" encoding="utf-8"?>
+<p:sld xmlns:a="http://schemas.openxmlformats.org/drawingml/2006/main" xmlns:r="http://schemas.openxmlformats.org/officeDocument/2006/relationships" xmlns:p="http://schemas.openxmlformats.org/presentationml/2006/main">
+  <p:cSld>
+    <p:bg>
+      <p:bgPr>
+        <a:solidFill>
+          <a:schemeClr val="bg1">
+            <a:lumMod val="95000"/>
+          </a:schemeClr>
+        </a:solidFill>
+        <a:effectLst/>
+      </p:bgPr>
+    </p:bg>
+    <p:spTree>
+      <p:nvGrpSpPr>
+        <p:cNvPr id="1" name=""/>
+        <p:cNvGrpSpPr/>
+        <p:nvPr/>
+      </p:nvGrpSpPr>
+      <p:grpSpPr>
+        <a:xfrm>
+          <a:off x="0" y="0"/>
+          <a:ext cx="0" cy="0"/>
+          <a:chOff x="0" y="0"/>
+          <a:chExt cx="0" cy="0"/>
+        </a:xfrm>
+      </p:grpSpPr>
+      <p:sp>
+        <p:nvSpPr>
+          <p:cNvPr id="2" name="Tytuł 1">
+            <a:extLst>
+              <a:ext uri="{FF2B5EF4-FFF2-40B4-BE49-F238E27FC236}">
                 <a16:creationId xmlns:a16="http://schemas.microsoft.com/office/drawing/2014/main" id="{E11C2F56-3D8F-42C6-87E9-FB1566CA3581}"/>
               </a:ext>
             </a:extLst>
@@ -5046,7 +5234,7 @@
 </p:sld>
 </file>
 
-<file path=ppt/slides/slide15.xml><?xml version="1.0" encoding="utf-8"?>
+<file path=ppt/slides/slide17.xml><?xml version="1.0" encoding="utf-8"?>
 <p:sld xmlns:a="http://schemas.openxmlformats.org/drawingml/2006/main" xmlns:r="http://schemas.openxmlformats.org/officeDocument/2006/relationships" xmlns:p="http://schemas.openxmlformats.org/presentationml/2006/main">
   <p:cSld>
     <p:spTree>
@@ -6707,6 +6895,42 @@
           </a:xfrm>
         </p:spPr>
       </p:pic>
+      <p:pic>
+        <p:nvPicPr>
+          <p:cNvPr id="7" name="Obraz 6">
+            <a:extLst>
+              <a:ext uri="{FF2B5EF4-FFF2-40B4-BE49-F238E27FC236}">
+                <a16:creationId xmlns:a16="http://schemas.microsoft.com/office/drawing/2014/main" id="{3401B1FB-51C6-4F3F-B908-17B776BAAF9D}"/>
+              </a:ext>
+            </a:extLst>
+          </p:cNvPr>
+          <p:cNvPicPr>
+            <a:picLocks noChangeAspect="1"/>
+          </p:cNvPicPr>
+          <p:nvPr/>
+        </p:nvPicPr>
+        <p:blipFill>
+          <a:blip r:embed="rId4">
+            <a:extLst>
+              <a:ext uri="{28A0092B-C50C-407E-A947-70E740481C1C}">
+                <a14:useLocalDpi xmlns:a14="http://schemas.microsoft.com/office/drawing/2010/main" val="0"/>
+              </a:ext>
+            </a:extLst>
+          </a:blip>
+          <a:stretch>
+            <a:fillRect/>
+          </a:stretch>
+        </p:blipFill>
+        <p:spPr>
+          <a:xfrm>
+            <a:off x="838199" y="604837"/>
+            <a:ext cx="10554401" cy="6148094"/>
+          </a:xfrm>
+          <a:prstGeom prst="rect">
+            <a:avLst/>
+          </a:prstGeom>
+        </p:spPr>
+      </p:pic>
     </p:spTree>
     <p:extLst>
       <p:ext uri="{BB962C8B-B14F-4D97-AF65-F5344CB8AC3E}">
@@ -6717,6 +6941,81 @@
   <p:clrMapOvr>
     <a:overrideClrMapping bg1="lt1" tx1="dk1" bg2="lt2" tx2="dk2" accent1="accent1" accent2="accent2" accent3="accent3" accent4="accent4" accent5="accent5" accent6="accent6" hlink="hlink" folHlink="folHlink"/>
   </p:clrMapOvr>
+  <p:timing>
+    <p:tnLst>
+      <p:par>
+        <p:cTn id="1" dur="indefinite" restart="never" nodeType="tmRoot">
+          <p:childTnLst>
+            <p:seq concurrent="1" nextAc="seek">
+              <p:cTn id="2" dur="indefinite" nodeType="mainSeq">
+                <p:childTnLst>
+                  <p:par>
+                    <p:cTn id="3" fill="hold">
+                      <p:stCondLst>
+                        <p:cond delay="indefinite"/>
+                      </p:stCondLst>
+                      <p:childTnLst>
+                        <p:par>
+                          <p:cTn id="4" fill="hold">
+                            <p:stCondLst>
+                              <p:cond delay="0"/>
+                            </p:stCondLst>
+                            <p:childTnLst>
+                              <p:par>
+                                <p:cTn id="5" presetID="1" presetClass="entr" presetSubtype="0" fill="hold" nodeType="clickEffect">
+                                  <p:stCondLst>
+                                    <p:cond delay="0"/>
+                                  </p:stCondLst>
+                                  <p:childTnLst>
+                                    <p:set>
+                                      <p:cBhvr>
+                                        <p:cTn id="6" dur="1" fill="hold">
+                                          <p:stCondLst>
+                                            <p:cond delay="0"/>
+                                          </p:stCondLst>
+                                        </p:cTn>
+                                        <p:tgtEl>
+                                          <p:spTgt spid="7"/>
+                                        </p:tgtEl>
+                                        <p:attrNameLst>
+                                          <p:attrName>style.visibility</p:attrName>
+                                        </p:attrNameLst>
+                                      </p:cBhvr>
+                                      <p:to>
+                                        <p:strVal val="visible"/>
+                                      </p:to>
+                                    </p:set>
+                                  </p:childTnLst>
+                                </p:cTn>
+                              </p:par>
+                            </p:childTnLst>
+                          </p:cTn>
+                        </p:par>
+                      </p:childTnLst>
+                    </p:cTn>
+                  </p:par>
+                </p:childTnLst>
+              </p:cTn>
+              <p:prevCondLst>
+                <p:cond evt="onPrev" delay="0">
+                  <p:tgtEl>
+                    <p:sldTgt/>
+                  </p:tgtEl>
+                </p:cond>
+              </p:prevCondLst>
+              <p:nextCondLst>
+                <p:cond evt="onNext" delay="0">
+                  <p:tgtEl>
+                    <p:sldTgt/>
+                  </p:tgtEl>
+                </p:cond>
+              </p:nextCondLst>
+            </p:seq>
+          </p:childTnLst>
+        </p:cTn>
+      </p:par>
+    </p:tnLst>
+  </p:timing>
 </p:sld>
 </file>
 
@@ -6866,7 +7165,12 @@
             <p:ph type="title"/>
           </p:nvPr>
         </p:nvSpPr>
-        <p:spPr/>
+        <p:spPr>
+          <a:xfrm>
+            <a:off x="838200" y="365125"/>
+            <a:ext cx="10515600" cy="909493"/>
+          </a:xfrm>
+        </p:spPr>
         <p:txBody>
           <a:bodyPr/>
           <a:lstStyle/>
@@ -6900,7 +7204,7 @@
         </p:nvSpPr>
         <p:spPr>
           <a:xfrm>
-            <a:off x="838200" y="1825625"/>
+            <a:off x="838200" y="1325673"/>
             <a:ext cx="10515600" cy="1158207"/>
           </a:xfrm>
         </p:spPr>
@@ -6938,7 +7242,7 @@
         <p:spPr>
           <a:xfrm>
             <a:off x="838200" y="2606207"/>
-            <a:ext cx="10515600" cy="1325563"/>
+            <a:ext cx="10515600" cy="691175"/>
           </a:xfrm>
           <a:prstGeom prst="rect">
             <a:avLst/>
@@ -6946,7 +7250,7 @@
         </p:spPr>
         <p:txBody>
           <a:bodyPr vert="horz" lIns="91440" tIns="45720" rIns="91440" bIns="45720" rtlCol="0" anchor="ctr">
-            <a:normAutofit/>
+            <a:normAutofit lnSpcReduction="10000"/>
           </a:bodyPr>
           <a:lstStyle>
             <a:lvl1pPr algn="l" defTabSz="914400" rtl="0" eaLnBrk="1" latinLnBrk="0" hangingPunct="1">
@@ -6995,7 +7299,7 @@
         </p:nvSpPr>
         <p:spPr>
           <a:xfrm>
-            <a:off x="838200" y="3764414"/>
+            <a:off x="838200" y="3265129"/>
             <a:ext cx="10515600" cy="1158207"/>
           </a:xfrm>
           <a:prstGeom prst="rect">
@@ -7184,6 +7488,42 @@
           </a:p>
         </p:txBody>
       </p:sp>
+      <p:pic>
+        <p:nvPicPr>
+          <p:cNvPr id="7" name="Obraz 6">
+            <a:extLst>
+              <a:ext uri="{FF2B5EF4-FFF2-40B4-BE49-F238E27FC236}">
+                <a16:creationId xmlns:a16="http://schemas.microsoft.com/office/drawing/2014/main" id="{CD9FF1EB-BBFC-40B6-933C-EB93ED73C7C2}"/>
+              </a:ext>
+            </a:extLst>
+          </p:cNvPr>
+          <p:cNvPicPr>
+            <a:picLocks noChangeAspect="1"/>
+          </p:cNvPicPr>
+          <p:nvPr/>
+        </p:nvPicPr>
+        <p:blipFill>
+          <a:blip r:embed="rId3">
+            <a:extLst>
+              <a:ext uri="{28A0092B-C50C-407E-A947-70E740481C1C}">
+                <a14:useLocalDpi xmlns:a14="http://schemas.microsoft.com/office/drawing/2010/main" val="0"/>
+              </a:ext>
+            </a:extLst>
+          </a:blip>
+          <a:stretch>
+            <a:fillRect/>
+          </a:stretch>
+        </p:blipFill>
+        <p:spPr>
+          <a:xfrm>
+            <a:off x="838200" y="4194073"/>
+            <a:ext cx="9518074" cy="2298802"/>
+          </a:xfrm>
+          <a:prstGeom prst="rect">
+            <a:avLst/>
+          </a:prstGeom>
+        </p:spPr>
+      </p:pic>
     </p:spTree>
     <p:extLst>
       <p:ext uri="{BB962C8B-B14F-4D97-AF65-F5344CB8AC3E}">
@@ -7959,6 +8299,92 @@
 </a:themeOverride>
 </file>
 
+<file path=ppt/theme/themeOverride13.xml><?xml version="1.0" encoding="utf-8"?>
+<a:themeOverride xmlns:a="http://schemas.openxmlformats.org/drawingml/2006/main">
+  <a:clrScheme name="Pakiet Office">
+    <a:dk1>
+      <a:sysClr val="windowText" lastClr="000000"/>
+    </a:dk1>
+    <a:lt1>
+      <a:sysClr val="window" lastClr="FFFFFF"/>
+    </a:lt1>
+    <a:dk2>
+      <a:srgbClr val="44546A"/>
+    </a:dk2>
+    <a:lt2>
+      <a:srgbClr val="E7E6E6"/>
+    </a:lt2>
+    <a:accent1>
+      <a:srgbClr val="4472C4"/>
+    </a:accent1>
+    <a:accent2>
+      <a:srgbClr val="ED7D31"/>
+    </a:accent2>
+    <a:accent3>
+      <a:srgbClr val="A5A5A5"/>
+    </a:accent3>
+    <a:accent4>
+      <a:srgbClr val="FFC000"/>
+    </a:accent4>
+    <a:accent5>
+      <a:srgbClr val="5B9BD5"/>
+    </a:accent5>
+    <a:accent6>
+      <a:srgbClr val="70AD47"/>
+    </a:accent6>
+    <a:hlink>
+      <a:srgbClr val="0563C1"/>
+    </a:hlink>
+    <a:folHlink>
+      <a:srgbClr val="954F72"/>
+    </a:folHlink>
+  </a:clrScheme>
+</a:themeOverride>
+</file>
+
+<file path=ppt/theme/themeOverride14.xml><?xml version="1.0" encoding="utf-8"?>
+<a:themeOverride xmlns:a="http://schemas.openxmlformats.org/drawingml/2006/main">
+  <a:clrScheme name="Pakiet Office">
+    <a:dk1>
+      <a:sysClr val="windowText" lastClr="000000"/>
+    </a:dk1>
+    <a:lt1>
+      <a:sysClr val="window" lastClr="FFFFFF"/>
+    </a:lt1>
+    <a:dk2>
+      <a:srgbClr val="44546A"/>
+    </a:dk2>
+    <a:lt2>
+      <a:srgbClr val="E7E6E6"/>
+    </a:lt2>
+    <a:accent1>
+      <a:srgbClr val="4472C4"/>
+    </a:accent1>
+    <a:accent2>
+      <a:srgbClr val="ED7D31"/>
+    </a:accent2>
+    <a:accent3>
+      <a:srgbClr val="A5A5A5"/>
+    </a:accent3>
+    <a:accent4>
+      <a:srgbClr val="FFC000"/>
+    </a:accent4>
+    <a:accent5>
+      <a:srgbClr val="5B9BD5"/>
+    </a:accent5>
+    <a:accent6>
+      <a:srgbClr val="70AD47"/>
+    </a:accent6>
+    <a:hlink>
+      <a:srgbClr val="0563C1"/>
+    </a:hlink>
+    <a:folHlink>
+      <a:srgbClr val="954F72"/>
+    </a:folHlink>
+  </a:clrScheme>
+</a:themeOverride>
+</file>
+
 <file path=ppt/theme/themeOverride2.xml><?xml version="1.0" encoding="utf-8"?>
 <a:themeOverride xmlns:a="http://schemas.openxmlformats.org/drawingml/2006/main">
   <a:clrScheme name="Pakiet Office">

</xml_diff>